<commit_message>
Add How to install slides
</commit_message>
<xml_diff>
--- a/RabbitMQNetCore.pptx
+++ b/RabbitMQNetCore.pptx
@@ -5,16 +5,17 @@
     <p:sldMasterId id="2147483648" r:id="rId1"/>
   </p:sldMasterIdLst>
   <p:notesMasterIdLst>
-    <p:notesMasterId r:id="rId9"/>
+    <p:notesMasterId r:id="rId10"/>
   </p:notesMasterIdLst>
   <p:sldIdLst>
     <p:sldId id="256" r:id="rId2"/>
     <p:sldId id="331" r:id="rId3"/>
     <p:sldId id="332" r:id="rId4"/>
     <p:sldId id="333" r:id="rId5"/>
-    <p:sldId id="334" r:id="rId6"/>
-    <p:sldId id="335" r:id="rId7"/>
-    <p:sldId id="330" r:id="rId8"/>
+    <p:sldId id="336" r:id="rId6"/>
+    <p:sldId id="334" r:id="rId7"/>
+    <p:sldId id="335" r:id="rId8"/>
+    <p:sldId id="330" r:id="rId9"/>
   </p:sldIdLst>
   <p:sldSz cx="12192000" cy="6858000"/>
   <p:notesSz cx="6858000" cy="9144000"/>
@@ -203,7 +204,7 @@
           <a:p>
             <a:fld id="{1747B90C-FE49-44DE-93E7-FA9DDECBEA03}" type="datetimeFigureOut">
               <a:rPr lang="en-US" smtClean="0"/>
-              <a:t>18-Feb-20</a:t>
+              <a:t>19-Feb-20</a:t>
             </a:fld>
             <a:endParaRPr lang="en-US"/>
           </a:p>
@@ -716,6 +717,105 @@
           <a:bodyPr/>
           <a:lstStyle/>
           <a:p>
+            <a:r>
+              <a:rPr lang="en-US" dirty="0" smtClean="0"/>
+              <a:t>Database</a:t>
+            </a:r>
+            <a:r>
+              <a:rPr lang="en-US" baseline="0" dirty="0" smtClean="0"/>
+              <a:t> </a:t>
+            </a:r>
+            <a:r>
+              <a:rPr lang="en-US" baseline="0" dirty="0" err="1" smtClean="0"/>
+              <a:t>dir</a:t>
+            </a:r>
+            <a:r>
+              <a:rPr lang="en-US" baseline="0" dirty="0" smtClean="0"/>
+              <a:t>: node name is appended</a:t>
+            </a:r>
+          </a:p>
+        </p:txBody>
+      </p:sp>
+      <p:sp>
+        <p:nvSpPr>
+          <p:cNvPr id="4" name="Slide Number Placeholder 3"/>
+          <p:cNvSpPr>
+            <a:spLocks noGrp="1"/>
+          </p:cNvSpPr>
+          <p:nvPr>
+            <p:ph type="sldNum" sz="quarter" idx="10"/>
+          </p:nvPr>
+        </p:nvSpPr>
+        <p:spPr/>
+        <p:txBody>
+          <a:bodyPr/>
+          <a:lstStyle/>
+          <a:p>
+            <a:fld id="{BA1D5B97-ACF5-4677-A104-92B2393AA446}" type="slidenum">
+              <a:rPr lang="en-US" smtClean="0"/>
+              <a:t>5</a:t>
+            </a:fld>
+            <a:endParaRPr lang="en-US"/>
+          </a:p>
+        </p:txBody>
+      </p:sp>
+    </p:spTree>
+    <p:extLst>
+      <p:ext uri="{BB962C8B-B14F-4D97-AF65-F5344CB8AC3E}">
+        <p14:creationId xmlns:p14="http://schemas.microsoft.com/office/powerpoint/2010/main" val="157833320"/>
+      </p:ext>
+    </p:extLst>
+  </p:cSld>
+  <p:clrMapOvr>
+    <a:masterClrMapping/>
+  </p:clrMapOvr>
+</p:notes>
+</file>
+
+<file path=ppt/notesSlides/notesSlide4.xml><?xml version="1.0" encoding="utf-8"?>
+<p:notes xmlns:a="http://schemas.openxmlformats.org/drawingml/2006/main" xmlns:r="http://schemas.openxmlformats.org/officeDocument/2006/relationships" xmlns:p="http://schemas.openxmlformats.org/presentationml/2006/main">
+  <p:cSld>
+    <p:spTree>
+      <p:nvGrpSpPr>
+        <p:cNvPr id="1" name=""/>
+        <p:cNvGrpSpPr/>
+        <p:nvPr/>
+      </p:nvGrpSpPr>
+      <p:grpSpPr>
+        <a:xfrm>
+          <a:off x="0" y="0"/>
+          <a:ext cx="0" cy="0"/>
+          <a:chOff x="0" y="0"/>
+          <a:chExt cx="0" cy="0"/>
+        </a:xfrm>
+      </p:grpSpPr>
+      <p:sp>
+        <p:nvSpPr>
+          <p:cNvPr id="2" name="Slide Image Placeholder 1"/>
+          <p:cNvSpPr>
+            <a:spLocks noGrp="1" noRot="1" noChangeAspect="1"/>
+          </p:cNvSpPr>
+          <p:nvPr>
+            <p:ph type="sldImg"/>
+          </p:nvPr>
+        </p:nvSpPr>
+        <p:spPr/>
+      </p:sp>
+      <p:sp>
+        <p:nvSpPr>
+          <p:cNvPr id="3" name="Notes Placeholder 2"/>
+          <p:cNvSpPr>
+            <a:spLocks noGrp="1"/>
+          </p:cNvSpPr>
+          <p:nvPr>
+            <p:ph type="body" idx="1"/>
+          </p:nvPr>
+        </p:nvSpPr>
+        <p:spPr/>
+        <p:txBody>
+          <a:bodyPr/>
+          <a:lstStyle/>
+          <a:p>
             <a:endParaRPr lang="en-US" dirty="0"/>
           </a:p>
         </p:txBody>
@@ -737,7 +837,7 @@
           <a:p>
             <a:fld id="{BA1D5B97-ACF5-4677-A104-92B2393AA446}" type="slidenum">
               <a:rPr lang="en-US" smtClean="0"/>
-              <a:t>7</a:t>
+              <a:t>8</a:t>
             </a:fld>
             <a:endParaRPr lang="en-US"/>
           </a:p>
@@ -887,7 +987,7 @@
           <a:p>
             <a:fld id="{622E22BE-79DE-4FFF-A515-BF1CA8DF801A}" type="datetimeFigureOut">
               <a:rPr lang="en-US" smtClean="0"/>
-              <a:t>18-Feb-20</a:t>
+              <a:t>19-Feb-20</a:t>
             </a:fld>
             <a:endParaRPr lang="en-US"/>
           </a:p>
@@ -1057,7 +1157,7 @@
           <a:p>
             <a:fld id="{622E22BE-79DE-4FFF-A515-BF1CA8DF801A}" type="datetimeFigureOut">
               <a:rPr lang="en-US" smtClean="0"/>
-              <a:t>18-Feb-20</a:t>
+              <a:t>19-Feb-20</a:t>
             </a:fld>
             <a:endParaRPr lang="en-US"/>
           </a:p>
@@ -1237,7 +1337,7 @@
           <a:p>
             <a:fld id="{622E22BE-79DE-4FFF-A515-BF1CA8DF801A}" type="datetimeFigureOut">
               <a:rPr lang="en-US" smtClean="0"/>
-              <a:t>18-Feb-20</a:t>
+              <a:t>19-Feb-20</a:t>
             </a:fld>
             <a:endParaRPr lang="en-US"/>
           </a:p>
@@ -1407,7 +1507,7 @@
           <a:p>
             <a:fld id="{622E22BE-79DE-4FFF-A515-BF1CA8DF801A}" type="datetimeFigureOut">
               <a:rPr lang="en-US" smtClean="0"/>
-              <a:t>18-Feb-20</a:t>
+              <a:t>19-Feb-20</a:t>
             </a:fld>
             <a:endParaRPr lang="en-US"/>
           </a:p>
@@ -1653,7 +1753,7 @@
           <a:p>
             <a:fld id="{622E22BE-79DE-4FFF-A515-BF1CA8DF801A}" type="datetimeFigureOut">
               <a:rPr lang="en-US" smtClean="0"/>
-              <a:t>18-Feb-20</a:t>
+              <a:t>19-Feb-20</a:t>
             </a:fld>
             <a:endParaRPr lang="en-US"/>
           </a:p>
@@ -1885,7 +1985,7 @@
           <a:p>
             <a:fld id="{622E22BE-79DE-4FFF-A515-BF1CA8DF801A}" type="datetimeFigureOut">
               <a:rPr lang="en-US" smtClean="0"/>
-              <a:t>18-Feb-20</a:t>
+              <a:t>19-Feb-20</a:t>
             </a:fld>
             <a:endParaRPr lang="en-US"/>
           </a:p>
@@ -2252,7 +2352,7 @@
           <a:p>
             <a:fld id="{622E22BE-79DE-4FFF-A515-BF1CA8DF801A}" type="datetimeFigureOut">
               <a:rPr lang="en-US" smtClean="0"/>
-              <a:t>18-Feb-20</a:t>
+              <a:t>19-Feb-20</a:t>
             </a:fld>
             <a:endParaRPr lang="en-US"/>
           </a:p>
@@ -2370,7 +2470,7 @@
           <a:p>
             <a:fld id="{622E22BE-79DE-4FFF-A515-BF1CA8DF801A}" type="datetimeFigureOut">
               <a:rPr lang="en-US" smtClean="0"/>
-              <a:t>18-Feb-20</a:t>
+              <a:t>19-Feb-20</a:t>
             </a:fld>
             <a:endParaRPr lang="en-US"/>
           </a:p>
@@ -2465,7 +2565,7 @@
           <a:p>
             <a:fld id="{622E22BE-79DE-4FFF-A515-BF1CA8DF801A}" type="datetimeFigureOut">
               <a:rPr lang="en-US" smtClean="0"/>
-              <a:t>18-Feb-20</a:t>
+              <a:t>19-Feb-20</a:t>
             </a:fld>
             <a:endParaRPr lang="en-US"/>
           </a:p>
@@ -2742,7 +2842,7 @@
           <a:p>
             <a:fld id="{622E22BE-79DE-4FFF-A515-BF1CA8DF801A}" type="datetimeFigureOut">
               <a:rPr lang="en-US" smtClean="0"/>
-              <a:t>18-Feb-20</a:t>
+              <a:t>19-Feb-20</a:t>
             </a:fld>
             <a:endParaRPr lang="en-US"/>
           </a:p>
@@ -2995,7 +3095,7 @@
           <a:p>
             <a:fld id="{622E22BE-79DE-4FFF-A515-BF1CA8DF801A}" type="datetimeFigureOut">
               <a:rPr lang="en-US" smtClean="0"/>
-              <a:t>18-Feb-20</a:t>
+              <a:t>19-Feb-20</a:t>
             </a:fld>
             <a:endParaRPr lang="en-US"/>
           </a:p>
@@ -3208,7 +3308,7 @@
           <a:p>
             <a:fld id="{622E22BE-79DE-4FFF-A515-BF1CA8DF801A}" type="datetimeFigureOut">
               <a:rPr lang="en-US" smtClean="0"/>
-              <a:t>18-Feb-20</a:t>
+              <a:t>19-Feb-20</a:t>
             </a:fld>
             <a:endParaRPr lang="en-US"/>
           </a:p>
@@ -4161,12 +4261,21 @@
             <p:ph type="title"/>
           </p:nvPr>
         </p:nvSpPr>
-        <p:spPr/>
-        <p:txBody>
-          <a:bodyPr/>
-          <a:lstStyle/>
-          <a:p>
-            <a:endParaRPr lang="en-US"/>
+        <p:spPr>
+          <a:xfrm>
+            <a:off x="838199" y="113506"/>
+            <a:ext cx="10515600" cy="1325563"/>
+          </a:xfrm>
+        </p:spPr>
+        <p:txBody>
+          <a:bodyPr/>
+          <a:lstStyle/>
+          <a:p>
+            <a:r>
+              <a:rPr lang="en-US" dirty="0" smtClean="0"/>
+              <a:t>How to install?</a:t>
+            </a:r>
+            <a:endParaRPr lang="en-US" dirty="0"/>
           </a:p>
         </p:txBody>
       </p:sp>
@@ -4180,11 +4289,239 @@
             <p:ph idx="1"/>
           </p:nvPr>
         </p:nvSpPr>
-        <p:spPr/>
-        <p:txBody>
-          <a:bodyPr/>
-          <a:lstStyle/>
-          <a:p>
+        <p:spPr>
+          <a:xfrm>
+            <a:off x="838199" y="1439069"/>
+            <a:ext cx="10515600" cy="4351338"/>
+          </a:xfrm>
+        </p:spPr>
+        <p:txBody>
+          <a:bodyPr/>
+          <a:lstStyle/>
+          <a:p>
+            <a:pPr marL="0" indent="0">
+              <a:buNone/>
+            </a:pPr>
+            <a:r>
+              <a:rPr lang="en-US" dirty="0"/>
+              <a:t>$ </a:t>
+            </a:r>
+            <a:r>
+              <a:rPr lang="en-US" dirty="0" err="1"/>
+              <a:t>docker</a:t>
+            </a:r>
+            <a:r>
+              <a:rPr lang="en-US" dirty="0"/>
+              <a:t> run -d --hostname my-rabbit --name some-rabbit rabbitmq:3</a:t>
+            </a:r>
+            <a:endParaRPr lang="en-US" dirty="0"/>
+          </a:p>
+        </p:txBody>
+      </p:sp>
+      <p:pic>
+        <p:nvPicPr>
+          <p:cNvPr id="6" name="Picture 5"/>
+          <p:cNvPicPr>
+            <a:picLocks noChangeAspect="1"/>
+          </p:cNvPicPr>
+          <p:nvPr/>
+        </p:nvPicPr>
+        <p:blipFill>
+          <a:blip r:embed="rId3"/>
+          <a:stretch>
+            <a:fillRect/>
+          </a:stretch>
+        </p:blipFill>
+        <p:spPr>
+          <a:xfrm>
+            <a:off x="177659" y="2329350"/>
+            <a:ext cx="11836681" cy="3982550"/>
+          </a:xfrm>
+          <a:prstGeom prst="rect">
+            <a:avLst/>
+          </a:prstGeom>
+        </p:spPr>
+      </p:pic>
+      <p:pic>
+        <p:nvPicPr>
+          <p:cNvPr id="7" name="Picture 6"/>
+          <p:cNvPicPr>
+            <a:picLocks noChangeAspect="1"/>
+          </p:cNvPicPr>
+          <p:nvPr/>
+        </p:nvPicPr>
+        <p:blipFill>
+          <a:blip r:embed="rId4"/>
+          <a:stretch>
+            <a:fillRect/>
+          </a:stretch>
+        </p:blipFill>
+        <p:spPr>
+          <a:xfrm>
+            <a:off x="3271837" y="3603015"/>
+            <a:ext cx="8380901" cy="860012"/>
+          </a:xfrm>
+          <a:prstGeom prst="rect">
+            <a:avLst/>
+          </a:prstGeom>
+        </p:spPr>
+      </p:pic>
+      <p:cxnSp>
+        <p:nvCxnSpPr>
+          <p:cNvPr id="11" name="Straight Connector 10"/>
+          <p:cNvCxnSpPr/>
+          <p:nvPr/>
+        </p:nvCxnSpPr>
+        <p:spPr>
+          <a:xfrm>
+            <a:off x="3271837" y="3614738"/>
+            <a:ext cx="8380901" cy="1"/>
+          </a:xfrm>
+          <a:prstGeom prst="line">
+            <a:avLst/>
+          </a:prstGeom>
+        </p:spPr>
+        <p:style>
+          <a:lnRef idx="1">
+            <a:schemeClr val="accent1"/>
+          </a:lnRef>
+          <a:fillRef idx="0">
+            <a:schemeClr val="accent1"/>
+          </a:fillRef>
+          <a:effectRef idx="0">
+            <a:schemeClr val="accent1"/>
+          </a:effectRef>
+          <a:fontRef idx="minor">
+            <a:schemeClr val="tx1"/>
+          </a:fontRef>
+        </p:style>
+      </p:cxnSp>
+      <p:cxnSp>
+        <p:nvCxnSpPr>
+          <p:cNvPr id="14" name="Straight Connector 13"/>
+          <p:cNvCxnSpPr/>
+          <p:nvPr/>
+        </p:nvCxnSpPr>
+        <p:spPr>
+          <a:xfrm>
+            <a:off x="3271837" y="3620065"/>
+            <a:ext cx="0" cy="848289"/>
+          </a:xfrm>
+          <a:prstGeom prst="line">
+            <a:avLst/>
+          </a:prstGeom>
+        </p:spPr>
+        <p:style>
+          <a:lnRef idx="1">
+            <a:schemeClr val="accent1"/>
+          </a:lnRef>
+          <a:fillRef idx="0">
+            <a:schemeClr val="accent1"/>
+          </a:fillRef>
+          <a:effectRef idx="0">
+            <a:schemeClr val="accent1"/>
+          </a:effectRef>
+          <a:fontRef idx="minor">
+            <a:schemeClr val="tx1"/>
+          </a:fontRef>
+        </p:style>
+      </p:cxnSp>
+      <p:cxnSp>
+        <p:nvCxnSpPr>
+          <p:cNvPr id="16" name="Straight Connector 15"/>
+          <p:cNvCxnSpPr/>
+          <p:nvPr/>
+        </p:nvCxnSpPr>
+        <p:spPr>
+          <a:xfrm>
+            <a:off x="11652738" y="3614738"/>
+            <a:ext cx="0" cy="848289"/>
+          </a:xfrm>
+          <a:prstGeom prst="line">
+            <a:avLst/>
+          </a:prstGeom>
+        </p:spPr>
+        <p:style>
+          <a:lnRef idx="1">
+            <a:schemeClr val="accent1"/>
+          </a:lnRef>
+          <a:fillRef idx="0">
+            <a:schemeClr val="accent1"/>
+          </a:fillRef>
+          <a:effectRef idx="0">
+            <a:schemeClr val="accent1"/>
+          </a:effectRef>
+          <a:fontRef idx="minor">
+            <a:schemeClr val="tx1"/>
+          </a:fontRef>
+        </p:style>
+      </p:cxnSp>
+      <p:cxnSp>
+        <p:nvCxnSpPr>
+          <p:cNvPr id="18" name="Straight Connector 17"/>
+          <p:cNvCxnSpPr/>
+          <p:nvPr/>
+        </p:nvCxnSpPr>
+        <p:spPr>
+          <a:xfrm>
+            <a:off x="3271837" y="4463027"/>
+            <a:ext cx="8380901" cy="0"/>
+          </a:xfrm>
+          <a:prstGeom prst="line">
+            <a:avLst/>
+          </a:prstGeom>
+        </p:spPr>
+        <p:style>
+          <a:lnRef idx="1">
+            <a:schemeClr val="accent1"/>
+          </a:lnRef>
+          <a:fillRef idx="0">
+            <a:schemeClr val="accent1"/>
+          </a:fillRef>
+          <a:effectRef idx="0">
+            <a:schemeClr val="accent1"/>
+          </a:effectRef>
+          <a:fontRef idx="minor">
+            <a:schemeClr val="tx1"/>
+          </a:fontRef>
+        </p:style>
+      </p:cxnSp>
+      <p:sp>
+        <p:nvSpPr>
+          <p:cNvPr id="22" name="Right Arrow 21"/>
+          <p:cNvSpPr/>
+          <p:nvPr/>
+        </p:nvSpPr>
+        <p:spPr>
+          <a:xfrm rot="3648052">
+            <a:off x="10583975" y="5123357"/>
+            <a:ext cx="1838587" cy="285786"/>
+          </a:xfrm>
+          <a:prstGeom prst="rightArrow">
+            <a:avLst/>
+          </a:prstGeom>
+        </p:spPr>
+        <p:style>
+          <a:lnRef idx="2">
+            <a:schemeClr val="accent1">
+              <a:shade val="50000"/>
+            </a:schemeClr>
+          </a:lnRef>
+          <a:fillRef idx="1">
+            <a:schemeClr val="accent1"/>
+          </a:fillRef>
+          <a:effectRef idx="0">
+            <a:schemeClr val="accent1"/>
+          </a:effectRef>
+          <a:fontRef idx="minor">
+            <a:schemeClr val="lt1"/>
+          </a:fontRef>
+        </p:style>
+        <p:txBody>
+          <a:bodyPr rtlCol="0" anchor="ctr"/>
+          <a:lstStyle/>
+          <a:p>
+            <a:pPr algn="ctr"/>
             <a:endParaRPr lang="en-US"/>
           </a:p>
         </p:txBody>
@@ -4263,38 +4600,120 @@
             <p:ph type="title"/>
           </p:nvPr>
         </p:nvSpPr>
-        <p:spPr/>
-        <p:txBody>
-          <a:bodyPr/>
-          <a:lstStyle/>
-          <a:p>
-            <a:endParaRPr lang="en-US"/>
-          </a:p>
-        </p:txBody>
-      </p:sp>
-      <p:sp>
-        <p:nvSpPr>
-          <p:cNvPr id="3" name="Content Placeholder 2"/>
-          <p:cNvSpPr>
-            <a:spLocks noGrp="1"/>
-          </p:cNvSpPr>
-          <p:nvPr>
-            <p:ph idx="1"/>
-          </p:nvPr>
-        </p:nvSpPr>
-        <p:spPr/>
-        <p:txBody>
-          <a:bodyPr/>
-          <a:lstStyle/>
-          <a:p>
-            <a:endParaRPr lang="en-US"/>
+        <p:spPr>
+          <a:xfrm>
+            <a:off x="838199" y="113506"/>
+            <a:ext cx="10515600" cy="1325563"/>
+          </a:xfrm>
+        </p:spPr>
+        <p:txBody>
+          <a:bodyPr/>
+          <a:lstStyle/>
+          <a:p>
+            <a:r>
+              <a:rPr lang="en-US" dirty="0" smtClean="0"/>
+              <a:t>How to install?</a:t>
+            </a:r>
+            <a:endParaRPr lang="en-US" dirty="0"/>
+          </a:p>
+        </p:txBody>
+      </p:sp>
+      <p:pic>
+        <p:nvPicPr>
+          <p:cNvPr id="8" name="Picture 7"/>
+          <p:cNvPicPr>
+            <a:picLocks noChangeAspect="1"/>
+          </p:cNvPicPr>
+          <p:nvPr/>
+        </p:nvPicPr>
+        <p:blipFill>
+          <a:blip r:embed="rId4"/>
+          <a:stretch>
+            <a:fillRect/>
+          </a:stretch>
+        </p:blipFill>
+        <p:spPr>
+          <a:xfrm>
+            <a:off x="4705349" y="1439069"/>
+            <a:ext cx="7278101" cy="5294313"/>
+          </a:xfrm>
+          <a:prstGeom prst="rect">
+            <a:avLst/>
+          </a:prstGeom>
+        </p:spPr>
+      </p:pic>
+      <p:sp>
+        <p:nvSpPr>
+          <p:cNvPr id="9" name="TextBox 8"/>
+          <p:cNvSpPr txBox="1"/>
+          <p:nvPr/>
+        </p:nvSpPr>
+        <p:spPr>
+          <a:xfrm>
+            <a:off x="123824" y="1439069"/>
+            <a:ext cx="5295900" cy="2677656"/>
+          </a:xfrm>
+          <a:prstGeom prst="rect">
+            <a:avLst/>
+          </a:prstGeom>
+          <a:noFill/>
+        </p:spPr>
+        <p:txBody>
+          <a:bodyPr wrap="square" rtlCol="0">
+            <a:spAutoFit/>
+          </a:bodyPr>
+          <a:lstStyle/>
+          <a:p>
+            <a:r>
+              <a:rPr lang="en-US" sz="2800" dirty="0" smtClean="0"/>
+              <a:t>Part of </a:t>
+            </a:r>
+            <a:r>
+              <a:rPr lang="en-US" sz="2800" dirty="0" err="1" smtClean="0"/>
+              <a:t>docker</a:t>
+            </a:r>
+            <a:r>
+              <a:rPr lang="en-US" sz="2800" dirty="0" smtClean="0"/>
+              <a:t> container logs:</a:t>
+            </a:r>
+          </a:p>
+          <a:p>
+            <a:endParaRPr lang="en-US" sz="2800" dirty="0"/>
+          </a:p>
+          <a:p>
+            <a:endParaRPr lang="en-US" sz="2800" dirty="0" smtClean="0"/>
+          </a:p>
+          <a:p>
+            <a:endParaRPr lang="en-US" sz="2800" dirty="0"/>
+          </a:p>
+          <a:p>
+            <a:r>
+              <a:rPr lang="en-US" sz="2800" dirty="0" smtClean="0"/>
+              <a:t>$ </a:t>
+            </a:r>
+            <a:r>
+              <a:rPr lang="en-US" sz="2800" dirty="0" err="1" smtClean="0"/>
+              <a:t>docker</a:t>
+            </a:r>
+            <a:r>
+              <a:rPr lang="en-US" sz="2800" dirty="0" smtClean="0"/>
+              <a:t> </a:t>
+            </a:r>
+            <a:r>
+              <a:rPr lang="en-US" sz="2800" dirty="0"/>
+              <a:t>logs some-rabbit</a:t>
+            </a:r>
+            <a:endParaRPr lang="en-US" sz="2800" dirty="0" smtClean="0"/>
+          </a:p>
+          <a:p>
+            <a:endParaRPr lang="en-US" sz="2800" dirty="0"/>
           </a:p>
         </p:txBody>
       </p:sp>
     </p:spTree>
     <p:extLst>
       <p:ext uri="{BB962C8B-B14F-4D97-AF65-F5344CB8AC3E}">
-        <p14:creationId xmlns:p14="http://schemas.microsoft.com/office/powerpoint/2010/main" val="26667205"/>
+        <p14:creationId xmlns:p14="http://schemas.microsoft.com/office/powerpoint/2010/main" val="931022375"/>
       </p:ext>
     </p:extLst>
   </p:cSld>
@@ -4396,6 +4815,108 @@
     </p:spTree>
     <p:extLst>
       <p:ext uri="{BB962C8B-B14F-4D97-AF65-F5344CB8AC3E}">
+        <p14:creationId xmlns:p14="http://schemas.microsoft.com/office/powerpoint/2010/main" val="26667205"/>
+      </p:ext>
+    </p:extLst>
+  </p:cSld>
+  <p:clrMapOvr>
+    <a:overrideClrMapping bg1="lt1" tx1="dk1" bg2="lt2" tx2="dk2" accent1="accent1" accent2="accent2" accent3="accent3" accent4="accent4" accent5="accent5" accent6="accent6" hlink="hlink" folHlink="folHlink"/>
+  </p:clrMapOvr>
+</p:sld>
+</file>
+
+<file path=ppt/slides/slide7.xml><?xml version="1.0" encoding="utf-8"?>
+<p:sld xmlns:a="http://schemas.openxmlformats.org/drawingml/2006/main" xmlns:r="http://schemas.openxmlformats.org/officeDocument/2006/relationships" xmlns:p="http://schemas.openxmlformats.org/presentationml/2006/main">
+  <p:cSld>
+    <p:bg>
+      <p:bgPr>
+        <a:gradFill>
+          <a:gsLst>
+            <a:gs pos="0">
+              <a:schemeClr val="accent1">
+                <a:lumMod val="5000"/>
+                <a:lumOff val="95000"/>
+              </a:schemeClr>
+            </a:gs>
+            <a:gs pos="42000">
+              <a:schemeClr val="accent1">
+                <a:lumMod val="45000"/>
+                <a:lumOff val="55000"/>
+              </a:schemeClr>
+            </a:gs>
+            <a:gs pos="83000">
+              <a:schemeClr val="accent1">
+                <a:lumMod val="45000"/>
+                <a:lumOff val="55000"/>
+              </a:schemeClr>
+            </a:gs>
+            <a:gs pos="100000">
+              <a:schemeClr val="accent1">
+                <a:lumMod val="30000"/>
+                <a:lumOff val="70000"/>
+              </a:schemeClr>
+            </a:gs>
+          </a:gsLst>
+          <a:lin ang="5400000" scaled="1"/>
+        </a:gradFill>
+        <a:effectLst/>
+      </p:bgPr>
+    </p:bg>
+    <p:spTree>
+      <p:nvGrpSpPr>
+        <p:cNvPr id="1" name=""/>
+        <p:cNvGrpSpPr/>
+        <p:nvPr/>
+      </p:nvGrpSpPr>
+      <p:grpSpPr>
+        <a:xfrm>
+          <a:off x="0" y="0"/>
+          <a:ext cx="0" cy="0"/>
+          <a:chOff x="0" y="0"/>
+          <a:chExt cx="0" cy="0"/>
+        </a:xfrm>
+      </p:grpSpPr>
+      <p:sp>
+        <p:nvSpPr>
+          <p:cNvPr id="2" name="Title 1"/>
+          <p:cNvSpPr>
+            <a:spLocks noGrp="1"/>
+          </p:cNvSpPr>
+          <p:nvPr>
+            <p:ph type="title"/>
+          </p:nvPr>
+        </p:nvSpPr>
+        <p:spPr/>
+        <p:txBody>
+          <a:bodyPr/>
+          <a:lstStyle/>
+          <a:p>
+            <a:endParaRPr lang="en-US"/>
+          </a:p>
+        </p:txBody>
+      </p:sp>
+      <p:sp>
+        <p:nvSpPr>
+          <p:cNvPr id="3" name="Content Placeholder 2"/>
+          <p:cNvSpPr>
+            <a:spLocks noGrp="1"/>
+          </p:cNvSpPr>
+          <p:nvPr>
+            <p:ph idx="1"/>
+          </p:nvPr>
+        </p:nvSpPr>
+        <p:spPr/>
+        <p:txBody>
+          <a:bodyPr/>
+          <a:lstStyle/>
+          <a:p>
+            <a:endParaRPr lang="en-US"/>
+          </a:p>
+        </p:txBody>
+      </p:sp>
+    </p:spTree>
+    <p:extLst>
+      <p:ext uri="{BB962C8B-B14F-4D97-AF65-F5344CB8AC3E}">
         <p14:creationId xmlns:p14="http://schemas.microsoft.com/office/powerpoint/2010/main" val="3470762276"/>
       </p:ext>
     </p:extLst>
@@ -4406,7 +4927,7 @@
 </p:sld>
 </file>
 
-<file path=ppt/slides/slide7.xml><?xml version="1.0" encoding="utf-8"?>
+<file path=ppt/slides/slide8.xml><?xml version="1.0" encoding="utf-8"?>
 <p:sld xmlns:a="http://schemas.openxmlformats.org/drawingml/2006/main" xmlns:r="http://schemas.openxmlformats.org/officeDocument/2006/relationships" xmlns:p="http://schemas.openxmlformats.org/presentationml/2006/main">
   <p:cSld>
     <p:bg>
@@ -5301,4 +5822,47 @@
     </a:folHlink>
   </a:clrScheme>
 </a:themeOverride>
+</file>
+
+<file path=ppt/theme/themeOverride6.xml><?xml version="1.0" encoding="utf-8"?>
+<a:themeOverride xmlns:a="http://schemas.openxmlformats.org/drawingml/2006/main">
+  <a:clrScheme name="Office">
+    <a:dk1>
+      <a:sysClr val="windowText" lastClr="000000"/>
+    </a:dk1>
+    <a:lt1>
+      <a:sysClr val="window" lastClr="FFFFFF"/>
+    </a:lt1>
+    <a:dk2>
+      <a:srgbClr val="44546A"/>
+    </a:dk2>
+    <a:lt2>
+      <a:srgbClr val="E7E6E6"/>
+    </a:lt2>
+    <a:accent1>
+      <a:srgbClr val="5B9BD5"/>
+    </a:accent1>
+    <a:accent2>
+      <a:srgbClr val="ED7D31"/>
+    </a:accent2>
+    <a:accent3>
+      <a:srgbClr val="A5A5A5"/>
+    </a:accent3>
+    <a:accent4>
+      <a:srgbClr val="FFC000"/>
+    </a:accent4>
+    <a:accent5>
+      <a:srgbClr val="4472C4"/>
+    </a:accent5>
+    <a:accent6>
+      <a:srgbClr val="70AD47"/>
+    </a:accent6>
+    <a:hlink>
+      <a:srgbClr val="0563C1"/>
+    </a:hlink>
+    <a:folHlink>
+      <a:srgbClr val="954F72"/>
+    </a:folHlink>
+  </a:clrScheme>
+</a:themeOverride>
 </file>
</xml_diff>